<commit_message>
added some more portfolio pages
</commit_message>
<xml_diff>
--- a/portfolio_cover_maker.pptx
+++ b/portfolio_cover_maker.pptx
@@ -8,8 +8,8 @@
     <p:sldId id="256" r:id="rId2"/>
     <p:sldId id="257" r:id="rId3"/>
     <p:sldId id="258" r:id="rId4"/>
-    <p:sldId id="261" r:id="rId5"/>
-    <p:sldId id="259" r:id="rId6"/>
+    <p:sldId id="259" r:id="rId5"/>
+    <p:sldId id="267" r:id="rId6"/>
     <p:sldId id="260" r:id="rId7"/>
     <p:sldId id="262" r:id="rId8"/>
     <p:sldId id="263" r:id="rId9"/>
@@ -114,6 +114,11 @@
       </a:defRPr>
     </a:lvl9pPr>
   </p:defaultTextStyle>
+  <p:extLst>
+    <p:ext uri="{EFAFB233-063F-42B5-8137-9DF3F51BA10A}">
+      <p15:sldGuideLst xmlns:p15="http://schemas.microsoft.com/office/powerpoint/2012/main"/>
+    </p:ext>
+  </p:extLst>
 </p:presentation>
 </file>
 
@@ -4830,261 +4835,6 @@
 <file path=ppt/slides/slide4.xml><?xml version="1.0" encoding="utf-8"?>
 <p:sld xmlns:a="http://schemas.openxmlformats.org/drawingml/2006/main" xmlns:r="http://schemas.openxmlformats.org/officeDocument/2006/relationships" xmlns:p="http://schemas.openxmlformats.org/presentationml/2006/main">
   <p:cSld>
-    <p:spTree>
-      <p:nvGrpSpPr>
-        <p:cNvPr id="1" name="">
-          <a:extLst>
-            <a:ext uri="{FF2B5EF4-FFF2-40B4-BE49-F238E27FC236}">
-              <a16:creationId xmlns:a16="http://schemas.microsoft.com/office/drawing/2014/main" id="{8A5FF09B-E828-A36A-AB52-7E38D525DFC2}"/>
-            </a:ext>
-          </a:extLst>
-        </p:cNvPr>
-        <p:cNvGrpSpPr/>
-        <p:nvPr/>
-      </p:nvGrpSpPr>
-      <p:grpSpPr>
-        <a:xfrm>
-          <a:off x="0" y="0"/>
-          <a:ext cx="0" cy="0"/>
-          <a:chOff x="0" y="0"/>
-          <a:chExt cx="0" cy="0"/>
-        </a:xfrm>
-      </p:grpSpPr>
-      <p:grpSp>
-        <p:nvGrpSpPr>
-          <p:cNvPr id="6" name="Group 5">
-            <a:extLst>
-              <a:ext uri="{FF2B5EF4-FFF2-40B4-BE49-F238E27FC236}">
-                <a16:creationId xmlns:a16="http://schemas.microsoft.com/office/drawing/2014/main" id="{EEA233F9-892D-0D1A-DEC0-8147B620A5D2}"/>
-              </a:ext>
-            </a:extLst>
-          </p:cNvPr>
-          <p:cNvGrpSpPr/>
-          <p:nvPr/>
-        </p:nvGrpSpPr>
-        <p:grpSpPr>
-          <a:xfrm>
-            <a:off x="2805112" y="1570435"/>
-            <a:ext cx="6581775" cy="4936331"/>
-            <a:chOff x="2805112" y="1570435"/>
-            <a:chExt cx="6581775" cy="4936331"/>
-          </a:xfrm>
-        </p:grpSpPr>
-        <p:sp>
-          <p:nvSpPr>
-            <p:cNvPr id="4" name="Rectangle 3">
-              <a:extLst>
-                <a:ext uri="{FF2B5EF4-FFF2-40B4-BE49-F238E27FC236}">
-                  <a16:creationId xmlns:a16="http://schemas.microsoft.com/office/drawing/2014/main" id="{19271881-DC3E-D7C1-E819-601068FA2BFA}"/>
-                </a:ext>
-              </a:extLst>
-            </p:cNvPr>
-            <p:cNvSpPr/>
-            <p:nvPr/>
-          </p:nvSpPr>
-          <p:spPr>
-            <a:xfrm>
-              <a:off x="2805112" y="1570435"/>
-              <a:ext cx="6581775" cy="4936331"/>
-            </a:xfrm>
-            <a:prstGeom prst="rect">
-              <a:avLst/>
-            </a:prstGeom>
-            <a:solidFill>
-              <a:srgbClr val="18274E"/>
-            </a:solidFill>
-          </p:spPr>
-          <p:style>
-            <a:lnRef idx="2">
-              <a:schemeClr val="accent1">
-                <a:shade val="15000"/>
-              </a:schemeClr>
-            </a:lnRef>
-            <a:fillRef idx="1">
-              <a:schemeClr val="accent1"/>
-            </a:fillRef>
-            <a:effectRef idx="0">
-              <a:schemeClr val="accent1"/>
-            </a:effectRef>
-            <a:fontRef idx="minor">
-              <a:schemeClr val="lt1"/>
-            </a:fontRef>
-          </p:style>
-          <p:txBody>
-            <a:bodyPr rtlCol="0" anchor="ctr"/>
-            <a:lstStyle/>
-            <a:p>
-              <a:pPr algn="ctr"/>
-              <a:endParaRPr lang="en-PH" sz="4000" dirty="0">
-                <a:latin typeface="ADLaM Display" panose="02010000000000000000" pitchFamily="2" charset="0"/>
-                <a:ea typeface="ADLaM Display" panose="02010000000000000000" pitchFamily="2" charset="0"/>
-                <a:cs typeface="ADLaM Display" panose="02010000000000000000" pitchFamily="2" charset="0"/>
-              </a:endParaRPr>
-            </a:p>
-          </p:txBody>
-        </p:sp>
-        <p:pic>
-          <p:nvPicPr>
-            <p:cNvPr id="1026" name="Picture 2" descr="What Is RGB Color Model? - Seahawk">
-              <a:extLst>
-                <a:ext uri="{FF2B5EF4-FFF2-40B4-BE49-F238E27FC236}">
-                  <a16:creationId xmlns:a16="http://schemas.microsoft.com/office/drawing/2014/main" id="{F7D09C82-F9B7-4EB5-B2EE-5D9E0C3CA35F}"/>
-                </a:ext>
-              </a:extLst>
-            </p:cNvPr>
-            <p:cNvPicPr>
-              <a:picLocks noChangeAspect="1" noChangeArrowheads="1"/>
-            </p:cNvPicPr>
-            <p:nvPr/>
-          </p:nvPicPr>
-          <p:blipFill rotWithShape="1">
-            <a:blip r:embed="rId2">
-              <a:clrChange>
-                <a:clrFrom>
-                  <a:srgbClr val="18274E"/>
-                </a:clrFrom>
-                <a:clrTo>
-                  <a:srgbClr val="18274E">
-                    <a:alpha val="0"/>
-                  </a:srgbClr>
-                </a:clrTo>
-              </a:clrChange>
-              <a:extLst>
-                <a:ext uri="{28A0092B-C50C-407E-A947-70E740481C1C}">
-                  <a14:useLocalDpi xmlns:a14="http://schemas.microsoft.com/office/drawing/2010/main" val="0"/>
-                </a:ext>
-              </a:extLst>
-            </a:blip>
-            <a:srcRect l="31289" t="22421" r="30445" b="23004"/>
-            <a:stretch/>
-          </p:blipFill>
-          <p:spPr bwMode="auto">
-            <a:xfrm>
-              <a:off x="3648075" y="3524250"/>
-              <a:ext cx="1006458" cy="1028700"/>
-            </a:xfrm>
-            <a:prstGeom prst="rect">
-              <a:avLst/>
-            </a:prstGeom>
-            <a:noFill/>
-            <a:extLst>
-              <a:ext uri="{909E8E84-426E-40DD-AFC4-6F175D3DCCD1}">
-                <a14:hiddenFill xmlns:a14="http://schemas.microsoft.com/office/drawing/2010/main">
-                  <a:solidFill>
-                    <a:srgbClr val="FFFFFF"/>
-                  </a:solidFill>
-                </a14:hiddenFill>
-              </a:ext>
-            </a:extLst>
-          </p:spPr>
-        </p:pic>
-        <p:sp>
-          <p:nvSpPr>
-            <p:cNvPr id="5" name="TextBox 4">
-              <a:extLst>
-                <a:ext uri="{FF2B5EF4-FFF2-40B4-BE49-F238E27FC236}">
-                  <a16:creationId xmlns:a16="http://schemas.microsoft.com/office/drawing/2014/main" id="{37E2AF81-B2F6-FC06-DE81-82446CA453FB}"/>
-                </a:ext>
-              </a:extLst>
-            </p:cNvPr>
-            <p:cNvSpPr txBox="1"/>
-            <p:nvPr/>
-          </p:nvSpPr>
-          <p:spPr>
-            <a:xfrm>
-              <a:off x="4732328" y="3715435"/>
-              <a:ext cx="3735397" cy="646331"/>
-            </a:xfrm>
-            <a:prstGeom prst="rect">
-              <a:avLst/>
-            </a:prstGeom>
-            <a:noFill/>
-          </p:spPr>
-          <p:txBody>
-            <a:bodyPr wrap="square" rtlCol="0">
-              <a:spAutoFit/>
-            </a:bodyPr>
-            <a:lstStyle/>
-            <a:p>
-              <a:r>
-                <a:rPr lang="en-US" sz="3600" dirty="0">
-                  <a:solidFill>
-                    <a:schemeClr val="bg1">
-                      <a:lumMod val="95000"/>
-                    </a:schemeClr>
-                  </a:solidFill>
-                  <a:latin typeface="ADLaM Display" panose="02010000000000000000" pitchFamily="2" charset="0"/>
-                  <a:ea typeface="ADLaM Display" panose="02010000000000000000" pitchFamily="2" charset="0"/>
-                  <a:cs typeface="ADLaM Display" panose="02010000000000000000" pitchFamily="2" charset="0"/>
-                </a:rPr>
-                <a:t>GUESS THE RGB</a:t>
-              </a:r>
-              <a:endParaRPr lang="en-PH" sz="3600" dirty="0">
-                <a:solidFill>
-                  <a:schemeClr val="bg1">
-                    <a:lumMod val="95000"/>
-                  </a:schemeClr>
-                </a:solidFill>
-                <a:latin typeface="ADLaM Display" panose="02010000000000000000" pitchFamily="2" charset="0"/>
-                <a:ea typeface="ADLaM Display" panose="02010000000000000000" pitchFamily="2" charset="0"/>
-                <a:cs typeface="ADLaM Display" panose="02010000000000000000" pitchFamily="2" charset="0"/>
-              </a:endParaRPr>
-            </a:p>
-          </p:txBody>
-        </p:sp>
-      </p:grpSp>
-      <p:pic>
-        <p:nvPicPr>
-          <p:cNvPr id="8" name="Picture 7">
-            <a:extLst>
-              <a:ext uri="{FF2B5EF4-FFF2-40B4-BE49-F238E27FC236}">
-                <a16:creationId xmlns:a16="http://schemas.microsoft.com/office/drawing/2014/main" id="{7FCAF411-1856-9767-50C1-8A7E18F2A44E}"/>
-              </a:ext>
-            </a:extLst>
-          </p:cNvPr>
-          <p:cNvPicPr>
-            <a:picLocks noChangeAspect="1"/>
-          </p:cNvPicPr>
-          <p:nvPr/>
-        </p:nvPicPr>
-        <p:blipFill>
-          <a:blip r:embed="rId3">
-            <a:extLst>
-              <a:ext uri="{28A0092B-C50C-407E-A947-70E740481C1C}">
-                <a14:useLocalDpi xmlns:a14="http://schemas.microsoft.com/office/drawing/2010/main" val="0"/>
-              </a:ext>
-            </a:extLst>
-          </a:blip>
-          <a:stretch>
-            <a:fillRect/>
-          </a:stretch>
-        </p:blipFill>
-        <p:spPr>
-          <a:xfrm>
-            <a:off x="2878121" y="6152466"/>
-            <a:ext cx="276910" cy="276910"/>
-          </a:xfrm>
-          <a:prstGeom prst="rect">
-            <a:avLst/>
-          </a:prstGeom>
-        </p:spPr>
-      </p:pic>
-    </p:spTree>
-    <p:extLst>
-      <p:ext uri="{BB962C8B-B14F-4D97-AF65-F5344CB8AC3E}">
-        <p14:creationId xmlns:p14="http://schemas.microsoft.com/office/powerpoint/2010/main" val="2143648730"/>
-      </p:ext>
-    </p:extLst>
-  </p:cSld>
-  <p:clrMapOvr>
-    <a:masterClrMapping/>
-  </p:clrMapOvr>
-</p:sld>
-</file>
-
-<file path=ppt/slides/slide5.xml><?xml version="1.0" encoding="utf-8"?>
-<p:sld xmlns:a="http://schemas.openxmlformats.org/drawingml/2006/main" xmlns:r="http://schemas.openxmlformats.org/officeDocument/2006/relationships" xmlns:p="http://schemas.openxmlformats.org/presentationml/2006/main">
-  <p:cSld>
     <p:bg>
       <p:bgPr>
         <a:solidFill>
@@ -5111,10 +4861,10 @@
       </p:grpSpPr>
       <p:grpSp>
         <p:nvGrpSpPr>
-          <p:cNvPr id="11" name="Group 10">
-            <a:extLst>
-              <a:ext uri="{FF2B5EF4-FFF2-40B4-BE49-F238E27FC236}">
-                <a16:creationId xmlns:a16="http://schemas.microsoft.com/office/drawing/2014/main" id="{E4D12776-CDE5-E9BF-E801-2B7A528CBA50}"/>
+          <p:cNvPr id="7" name="Group 6">
+            <a:extLst>
+              <a:ext uri="{FF2B5EF4-FFF2-40B4-BE49-F238E27FC236}">
+                <a16:creationId xmlns:a16="http://schemas.microsoft.com/office/drawing/2014/main" id="{B8F3BCB4-37BB-E0D9-F9E2-C49D52965E81}"/>
               </a:ext>
             </a:extLst>
           </p:cNvPr>
@@ -5124,9 +4874,9 @@
         <p:grpSpPr>
           <a:xfrm>
             <a:off x="2961479" y="1091488"/>
-            <a:ext cx="6140072" cy="4547312"/>
+            <a:ext cx="6140072" cy="4465467"/>
             <a:chOff x="2961479" y="1091488"/>
-            <a:chExt cx="6140072" cy="4547312"/>
+            <a:chExt cx="6140072" cy="4465467"/>
           </a:xfrm>
         </p:grpSpPr>
         <p:sp>
@@ -5295,59 +5045,62 @@
         </p:sp>
         <p:pic>
           <p:nvPicPr>
-            <p:cNvPr id="6146" name="Picture 2" descr="icon-tableau - Best Institute for Data Analytics &amp; Data Science Courses">
+            <p:cNvPr id="2" name="Picture 1">
               <a:extLst>
                 <a:ext uri="{FF2B5EF4-FFF2-40B4-BE49-F238E27FC236}">
-                  <a16:creationId xmlns:a16="http://schemas.microsoft.com/office/drawing/2014/main" id="{C888DE2C-4C63-B612-C03D-BF721469E1EE}"/>
+                  <a16:creationId xmlns:a16="http://schemas.microsoft.com/office/drawing/2014/main" id="{6017C0A8-DD13-272F-59D6-3CF7A567C15D}"/>
                 </a:ext>
               </a:extLst>
             </p:cNvPr>
             <p:cNvPicPr>
-              <a:picLocks noChangeAspect="1" noChangeArrowheads="1"/>
+              <a:picLocks noChangeAspect="1"/>
             </p:cNvPicPr>
             <p:nvPr/>
           </p:nvPicPr>
           <p:blipFill>
-            <a:blip r:embed="rId3">
-              <a:clrChange>
-                <a:clrFrom>
-                  <a:srgbClr val="FFFFFF"/>
-                </a:clrFrom>
-                <a:clrTo>
-                  <a:srgbClr val="FFFFFF">
-                    <a:alpha val="0"/>
-                  </a:srgbClr>
-                </a:clrTo>
-              </a:clrChange>
-              <a:extLst>
-                <a:ext uri="{28A0092B-C50C-407E-A947-70E740481C1C}">
-                  <a14:useLocalDpi xmlns:a14="http://schemas.microsoft.com/office/drawing/2010/main" val="0"/>
-                </a:ext>
-              </a:extLst>
-            </a:blip>
-            <a:srcRect/>
+            <a:blip r:embed="rId3"/>
             <a:stretch>
               <a:fillRect/>
             </a:stretch>
           </p:blipFill>
-          <p:spPr bwMode="auto">
+          <p:spPr>
             <a:xfrm>
-              <a:off x="8202622" y="4815686"/>
-              <a:ext cx="823114" cy="823114"/>
+              <a:off x="8620206" y="5005721"/>
+              <a:ext cx="481345" cy="481345"/>
             </a:xfrm>
             <a:prstGeom prst="rect">
               <a:avLst/>
             </a:prstGeom>
-            <a:noFill/>
-            <a:extLst>
-              <a:ext uri="{909E8E84-426E-40DD-AFC4-6F175D3DCCD1}">
-                <a14:hiddenFill xmlns:a14="http://schemas.microsoft.com/office/drawing/2010/main">
-                  <a:solidFill>
-                    <a:srgbClr val="FFFFFF"/>
-                  </a:solidFill>
-                </a14:hiddenFill>
-              </a:ext>
-            </a:extLst>
+          </p:spPr>
+        </p:pic>
+        <p:pic>
+          <p:nvPicPr>
+            <p:cNvPr id="3" name="Picture 2">
+              <a:extLst>
+                <a:ext uri="{FF2B5EF4-FFF2-40B4-BE49-F238E27FC236}">
+                  <a16:creationId xmlns:a16="http://schemas.microsoft.com/office/drawing/2014/main" id="{D67B5D14-2594-0279-5916-733E6ED004A9}"/>
+                </a:ext>
+              </a:extLst>
+            </p:cNvPr>
+            <p:cNvPicPr>
+              <a:picLocks noChangeAspect="1"/>
+            </p:cNvPicPr>
+            <p:nvPr/>
+          </p:nvPicPr>
+          <p:blipFill>
+            <a:blip r:embed="rId4"/>
+            <a:stretch>
+              <a:fillRect/>
+            </a:stretch>
+          </p:blipFill>
+          <p:spPr>
+            <a:xfrm>
+              <a:off x="8206199" y="5039389"/>
+              <a:ext cx="414007" cy="414007"/>
+            </a:xfrm>
+            <a:prstGeom prst="rect">
+              <a:avLst/>
+            </a:prstGeom>
           </p:spPr>
         </p:pic>
       </p:grpSp>
@@ -5355,6 +5108,268 @@
     <p:extLst>
       <p:ext uri="{BB962C8B-B14F-4D97-AF65-F5344CB8AC3E}">
         <p14:creationId xmlns:p14="http://schemas.microsoft.com/office/powerpoint/2010/main" val="2943020442"/>
+      </p:ext>
+    </p:extLst>
+  </p:cSld>
+  <p:clrMapOvr>
+    <a:masterClrMapping/>
+  </p:clrMapOvr>
+</p:sld>
+</file>
+
+<file path=ppt/slides/slide5.xml><?xml version="1.0" encoding="utf-8"?>
+<p:sld xmlns:a="http://schemas.openxmlformats.org/drawingml/2006/main" xmlns:r="http://schemas.openxmlformats.org/officeDocument/2006/relationships" xmlns:p="http://schemas.openxmlformats.org/presentationml/2006/main">
+  <p:cSld>
+    <p:spTree>
+      <p:nvGrpSpPr>
+        <p:cNvPr id="1" name=""/>
+        <p:cNvGrpSpPr/>
+        <p:nvPr/>
+      </p:nvGrpSpPr>
+      <p:grpSpPr>
+        <a:xfrm>
+          <a:off x="0" y="0"/>
+          <a:ext cx="0" cy="0"/>
+          <a:chOff x="0" y="0"/>
+          <a:chExt cx="0" cy="0"/>
+        </a:xfrm>
+      </p:grpSpPr>
+      <p:grpSp>
+        <p:nvGrpSpPr>
+          <p:cNvPr id="12" name="Group 11">
+            <a:extLst>
+              <a:ext uri="{FF2B5EF4-FFF2-40B4-BE49-F238E27FC236}">
+                <a16:creationId xmlns:a16="http://schemas.microsoft.com/office/drawing/2014/main" id="{B52DFBA8-8148-26C2-CE28-B67D6E37A98F}"/>
+              </a:ext>
+            </a:extLst>
+          </p:cNvPr>
+          <p:cNvGrpSpPr/>
+          <p:nvPr/>
+        </p:nvGrpSpPr>
+        <p:grpSpPr>
+          <a:xfrm>
+            <a:off x="2209800" y="561975"/>
+            <a:ext cx="7429500" cy="5566764"/>
+            <a:chOff x="2209800" y="561975"/>
+            <a:chExt cx="7429500" cy="5566764"/>
+          </a:xfrm>
+        </p:grpSpPr>
+        <p:sp>
+          <p:nvSpPr>
+            <p:cNvPr id="7" name="Rectangle 6">
+              <a:extLst>
+                <a:ext uri="{FF2B5EF4-FFF2-40B4-BE49-F238E27FC236}">
+                  <a16:creationId xmlns:a16="http://schemas.microsoft.com/office/drawing/2014/main" id="{FE973438-D769-902E-FE6F-83488622A7F8}"/>
+                </a:ext>
+              </a:extLst>
+            </p:cNvPr>
+            <p:cNvSpPr/>
+            <p:nvPr/>
+          </p:nvSpPr>
+          <p:spPr>
+            <a:xfrm>
+              <a:off x="2209800" y="561975"/>
+              <a:ext cx="7429500" cy="5562600"/>
+            </a:xfrm>
+            <a:prstGeom prst="rect">
+              <a:avLst/>
+            </a:prstGeom>
+            <a:solidFill>
+              <a:schemeClr val="bg1"/>
+            </a:solidFill>
+            <a:ln>
+              <a:noFill/>
+            </a:ln>
+          </p:spPr>
+          <p:style>
+            <a:lnRef idx="2">
+              <a:schemeClr val="accent1">
+                <a:shade val="15000"/>
+              </a:schemeClr>
+            </a:lnRef>
+            <a:fillRef idx="1">
+              <a:schemeClr val="accent1"/>
+            </a:fillRef>
+            <a:effectRef idx="0">
+              <a:schemeClr val="accent1"/>
+            </a:effectRef>
+            <a:fontRef idx="minor">
+              <a:schemeClr val="lt1"/>
+            </a:fontRef>
+          </p:style>
+          <p:txBody>
+            <a:bodyPr rtlCol="0" anchor="ctr"/>
+            <a:lstStyle/>
+            <a:p>
+              <a:pPr algn="ctr"/>
+              <a:endParaRPr lang="en-PH"/>
+            </a:p>
+          </p:txBody>
+        </p:sp>
+        <p:pic>
+          <p:nvPicPr>
+            <p:cNvPr id="5" name="Picture 4">
+              <a:extLst>
+                <a:ext uri="{FF2B5EF4-FFF2-40B4-BE49-F238E27FC236}">
+                  <a16:creationId xmlns:a16="http://schemas.microsoft.com/office/drawing/2014/main" id="{47A39DED-48CE-D737-9420-EAE070DDF172}"/>
+                </a:ext>
+              </a:extLst>
+            </p:cNvPr>
+            <p:cNvPicPr>
+              <a:picLocks noChangeAspect="1"/>
+            </p:cNvPicPr>
+            <p:nvPr/>
+          </p:nvPicPr>
+          <p:blipFill rotWithShape="1">
+            <a:blip r:embed="rId2">
+              <a:alphaModFix amt="20000"/>
+              <a:extLst>
+                <a:ext uri="{BEBA8EAE-BF5A-486C-A8C5-ECC9F3942E4B}">
+                  <a14:imgProps xmlns:a14="http://schemas.microsoft.com/office/drawing/2010/main">
+                    <a14:imgLayer r:embed="rId3">
+                      <a14:imgEffect>
+                        <a14:artisticBlur radius="2"/>
+                      </a14:imgEffect>
+                    </a14:imgLayer>
+                  </a14:imgProps>
+                </a:ext>
+              </a:extLst>
+            </a:blip>
+            <a:srcRect l="676" r="676"/>
+            <a:stretch/>
+          </p:blipFill>
+          <p:spPr>
+            <a:xfrm>
+              <a:off x="2226489" y="571500"/>
+              <a:ext cx="7409652" cy="5557239"/>
+            </a:xfrm>
+            <a:prstGeom prst="rect">
+              <a:avLst/>
+            </a:prstGeom>
+          </p:spPr>
+        </p:pic>
+        <p:sp>
+          <p:nvSpPr>
+            <p:cNvPr id="6" name="TextBox 5">
+              <a:extLst>
+                <a:ext uri="{FF2B5EF4-FFF2-40B4-BE49-F238E27FC236}">
+                  <a16:creationId xmlns:a16="http://schemas.microsoft.com/office/drawing/2014/main" id="{1353431D-B176-0702-5844-6BCBAAD93EA9}"/>
+                </a:ext>
+              </a:extLst>
+            </p:cNvPr>
+            <p:cNvSpPr txBox="1"/>
+            <p:nvPr/>
+          </p:nvSpPr>
+          <p:spPr>
+            <a:xfrm>
+              <a:off x="2445996" y="1720840"/>
+              <a:ext cx="6970639" cy="3416320"/>
+            </a:xfrm>
+            <a:prstGeom prst="rect">
+              <a:avLst/>
+            </a:prstGeom>
+            <a:noFill/>
+          </p:spPr>
+          <p:txBody>
+            <a:bodyPr wrap="square" rtlCol="0">
+              <a:spAutoFit/>
+            </a:bodyPr>
+            <a:lstStyle/>
+            <a:p>
+              <a:pPr algn="ctr"/>
+              <a:r>
+                <a:rPr lang="en-US" sz="7200" dirty="0">
+                  <a:solidFill>
+                    <a:schemeClr val="tx1">
+                      <a:lumMod val="95000"/>
+                      <a:lumOff val="5000"/>
+                    </a:schemeClr>
+                  </a:solidFill>
+                  <a:latin typeface="Aharoni" panose="02010803020104030203" pitchFamily="2" charset="-79"/>
+                  <a:ea typeface="ADLaM Display" panose="02010000000000000000" pitchFamily="2" charset="0"/>
+                  <a:cs typeface="Aharoni" panose="02010803020104030203" pitchFamily="2" charset="-79"/>
+                </a:rPr>
+                <a:t>FINANCE MANAGEMENT TOOL</a:t>
+              </a:r>
+              <a:endParaRPr lang="en-US" sz="4400" dirty="0">
+                <a:solidFill>
+                  <a:schemeClr val="tx1">
+                    <a:lumMod val="95000"/>
+                    <a:lumOff val="5000"/>
+                  </a:schemeClr>
+                </a:solidFill>
+                <a:latin typeface="Aharoni" panose="02010803020104030203" pitchFamily="2" charset="-79"/>
+                <a:ea typeface="ADLaM Display" panose="02010000000000000000" pitchFamily="2" charset="0"/>
+                <a:cs typeface="Aharoni" panose="02010803020104030203" pitchFamily="2" charset="-79"/>
+              </a:endParaRPr>
+            </a:p>
+          </p:txBody>
+        </p:sp>
+        <p:pic>
+          <p:nvPicPr>
+            <p:cNvPr id="9" name="Picture 8">
+              <a:extLst>
+                <a:ext uri="{FF2B5EF4-FFF2-40B4-BE49-F238E27FC236}">
+                  <a16:creationId xmlns:a16="http://schemas.microsoft.com/office/drawing/2014/main" id="{234D509C-CE5D-87D7-BBE0-585919F05EC2}"/>
+                </a:ext>
+              </a:extLst>
+            </p:cNvPr>
+            <p:cNvPicPr>
+              <a:picLocks noChangeAspect="1"/>
+            </p:cNvPicPr>
+            <p:nvPr/>
+          </p:nvPicPr>
+          <p:blipFill>
+            <a:blip r:embed="rId4"/>
+            <a:stretch>
+              <a:fillRect/>
+            </a:stretch>
+          </p:blipFill>
+          <p:spPr>
+            <a:xfrm>
+              <a:off x="9043737" y="5600700"/>
+              <a:ext cx="481932" cy="448228"/>
+            </a:xfrm>
+            <a:prstGeom prst="rect">
+              <a:avLst/>
+            </a:prstGeom>
+          </p:spPr>
+        </p:pic>
+        <p:pic>
+          <p:nvPicPr>
+            <p:cNvPr id="11" name="Picture 10">
+              <a:extLst>
+                <a:ext uri="{FF2B5EF4-FFF2-40B4-BE49-F238E27FC236}">
+                  <a16:creationId xmlns:a16="http://schemas.microsoft.com/office/drawing/2014/main" id="{3DE47DF0-FD49-FBB9-423D-133E7AB735FB}"/>
+                </a:ext>
+              </a:extLst>
+            </p:cNvPr>
+            <p:cNvPicPr>
+              <a:picLocks noChangeAspect="1"/>
+            </p:cNvPicPr>
+            <p:nvPr/>
+          </p:nvPicPr>
+          <p:blipFill>
+            <a:blip r:embed="rId5"/>
+            <a:stretch>
+              <a:fillRect/>
+            </a:stretch>
+          </p:blipFill>
+          <p:spPr>
+            <a:xfrm>
+              <a:off x="8485037" y="5588701"/>
+              <a:ext cx="448228" cy="448228"/>
+            </a:xfrm>
+            <a:prstGeom prst="rect">
+              <a:avLst/>
+            </a:prstGeom>
+          </p:spPr>
+        </p:pic>
+      </p:grpSp>
+    </p:spTree>
+    <p:extLst>
+      <p:ext uri="{BB962C8B-B14F-4D97-AF65-F5344CB8AC3E}">
+        <p14:creationId xmlns:p14="http://schemas.microsoft.com/office/powerpoint/2010/main" val="4087445858"/>
       </p:ext>
     </p:extLst>
   </p:cSld>

</xml_diff>